<commit_message>
Add dump/load data on backend
Добавил в серверную часть способ делать дамп и загрузку с дампа данные и перешел на БД PostgreSQL
</commit_message>
<xml_diff>
--- a/Docs/Презентация.pptx
+++ b/Docs/Презентация.pptx
@@ -335,7 +335,7 @@
           <a:p>
             <a:fld id="{9AB3A824-1A51-4B26-AD58-A6D8E14F6C04}" type="datetimeFigureOut">
               <a:rPr lang="en-US" dirty="0"/>
-              <a:t>9/27/2022</a:t>
+              <a:t>10/3/2022</a:t>
             </a:fld>
             <a:endParaRPr lang="en-US" dirty="0"/>
           </a:p>
@@ -669,7 +669,7 @@
           <a:p>
             <a:fld id="{D857E33E-8B18-4087-B112-809917729534}" type="datetimeFigureOut">
               <a:rPr lang="en-US" dirty="0"/>
-              <a:t>9/27/2022</a:t>
+              <a:t>10/3/2022</a:t>
             </a:fld>
             <a:endParaRPr lang="en-US" dirty="0"/>
           </a:p>
@@ -971,7 +971,7 @@
           <a:p>
             <a:fld id="{D3FFE419-2371-464F-8239-3959401C3561}" type="datetimeFigureOut">
               <a:rPr lang="en-US" dirty="0"/>
-              <a:t>9/27/2022</a:t>
+              <a:t>10/3/2022</a:t>
             </a:fld>
             <a:endParaRPr lang="en-US" dirty="0"/>
           </a:p>
@@ -1218,7 +1218,7 @@
           <a:p>
             <a:fld id="{97D162C4-EDD9-4389-A98B-B87ECEA2A816}" type="datetimeFigureOut">
               <a:rPr lang="en-US" dirty="0"/>
-              <a:t>9/27/2022</a:t>
+              <a:t>10/3/2022</a:t>
             </a:fld>
             <a:endParaRPr lang="en-US" dirty="0"/>
           </a:p>
@@ -1625,7 +1625,7 @@
           <a:p>
             <a:fld id="{3E5059C3-6A89-4494-99FF-5A4D6FFD50EB}" type="datetimeFigureOut">
               <a:rPr lang="en-US" dirty="0"/>
-              <a:t>9/27/2022</a:t>
+              <a:t>10/3/2022</a:t>
             </a:fld>
             <a:endParaRPr lang="en-US" dirty="0"/>
           </a:p>
@@ -1939,7 +1939,7 @@
           <a:p>
             <a:fld id="{CA954B2F-12DE-47F5-8894-472B206D2E1E}" type="datetimeFigureOut">
               <a:rPr lang="en-US" dirty="0"/>
-              <a:t>9/27/2022</a:t>
+              <a:t>10/3/2022</a:t>
             </a:fld>
             <a:endParaRPr lang="en-US" dirty="0"/>
           </a:p>
@@ -2483,7 +2483,7 @@
           <a:p>
             <a:fld id="{3F30E46F-7819-4ACF-B48B-48222C2ACC88}" type="datetimeFigureOut">
               <a:rPr lang="en-US" dirty="0"/>
-              <a:t>9/27/2022</a:t>
+              <a:t>10/3/2022</a:t>
             </a:fld>
             <a:endParaRPr lang="en-US" dirty="0"/>
           </a:p>
@@ -2678,7 +2678,7 @@
           <a:p>
             <a:fld id="{1FAF3416-4057-4DAA-829D-4CA07428D088}" type="datetimeFigureOut">
               <a:rPr lang="en-US" dirty="0"/>
-              <a:t>9/27/2022</a:t>
+              <a:t>10/3/2022</a:t>
             </a:fld>
             <a:endParaRPr lang="en-US" dirty="0"/>
           </a:p>
@@ -2891,7 +2891,7 @@
           <a:p>
             <a:fld id="{921D9284-D300-4297-87F7-E791DCC15DB1}" type="datetimeFigureOut">
               <a:rPr lang="en-US" dirty="0"/>
-              <a:t>9/27/2022</a:t>
+              <a:t>10/3/2022</a:t>
             </a:fld>
             <a:endParaRPr lang="en-US" dirty="0"/>
           </a:p>
@@ -3260,7 +3260,7 @@
           <a:p>
             <a:fld id="{37D525BB-DA17-4BA0-B3C8-3AC3ABC827E6}" type="datetimeFigureOut">
               <a:rPr lang="en-US" dirty="0"/>
-              <a:t>9/27/2022</a:t>
+              <a:t>10/3/2022</a:t>
             </a:fld>
             <a:endParaRPr lang="en-US" dirty="0"/>
           </a:p>
@@ -3663,7 +3663,7 @@
           <a:p>
             <a:fld id="{B16C4C9A-3960-41CF-A4E9-2A8FB932454B}" type="datetimeFigureOut">
               <a:rPr lang="en-US" dirty="0"/>
-              <a:t>9/27/2022</a:t>
+              <a:t>10/3/2022</a:t>
             </a:fld>
             <a:endParaRPr lang="en-US" dirty="0"/>
           </a:p>
@@ -3974,7 +3974,7 @@
           <a:p>
             <a:fld id="{3CBC1C18-307B-4F68-A007-B5B542270E8D}" type="datetimeFigureOut">
               <a:rPr lang="en-US" dirty="0"/>
-              <a:t>9/27/2022</a:t>
+              <a:t>10/3/2022</a:t>
             </a:fld>
             <a:endParaRPr lang="en-US" dirty="0"/>
           </a:p>
@@ -4553,14 +4553,14 @@
         </p:spPr>
         <p:txBody>
           <a:bodyPr>
-            <a:normAutofit/>
+            <a:normAutofit fontScale="92500"/>
           </a:bodyPr>
           <a:lstStyle/>
           <a:p>
             <a:r>
               <a:rPr lang="ru-RU" dirty="0">
                 <a:latin typeface="Calibri Light" panose="020F0302020204030204" pitchFamily="34" charset="0"/>
-                <a:ea typeface="Cambria" panose="02040503050406030204" pitchFamily="18" charset="0"/>
+                <a:ea typeface="Calibri Light" panose="020F0302020204030204" pitchFamily="34" charset="0"/>
                 <a:cs typeface="Calibri Light" panose="020F0302020204030204" pitchFamily="34" charset="0"/>
               </a:rPr>
               <a:t>Тема: </a:t>
@@ -4572,39 +4572,19 @@
                 </a:solidFill>
                 <a:effectLst/>
                 <a:latin typeface="Calibri Light" panose="020F0302020204030204" pitchFamily="34" charset="0"/>
+                <a:ea typeface="Calibri Light" panose="020F0302020204030204" pitchFamily="34" charset="0"/>
                 <a:cs typeface="Calibri Light" panose="020F0302020204030204" pitchFamily="34" charset="0"/>
               </a:rPr>
-              <a:t>Спроектировать </a:t>
-            </a:r>
-            <a:r>
-              <a:rPr lang="ru-RU" b="0" i="0" dirty="0" err="1">
+              <a:t>Спроектировать Web-приложение почтового отделения для управления подписками и доставкой периодических изданий</a:t>
+            </a:r>
+            <a:r>
+              <a:rPr lang="en-US" b="0" i="0" dirty="0">
                 <a:solidFill>
                   <a:srgbClr val="DCDDDE"/>
                 </a:solidFill>
                 <a:effectLst/>
                 <a:latin typeface="Calibri Light" panose="020F0302020204030204" pitchFamily="34" charset="0"/>
-                <a:cs typeface="Calibri Light" panose="020F0302020204030204" pitchFamily="34" charset="0"/>
-              </a:rPr>
-              <a:t>Web</a:t>
-            </a:r>
-            <a:r>
-              <a:rPr lang="ru-RU" b="0" i="0" dirty="0">
-                <a:solidFill>
-                  <a:srgbClr val="DCDDDE"/>
-                </a:solidFill>
-                <a:effectLst/>
-                <a:latin typeface="Calibri Light" panose="020F0302020204030204" pitchFamily="34" charset="0"/>
-                <a:cs typeface="Calibri Light" panose="020F0302020204030204" pitchFamily="34" charset="0"/>
-              </a:rPr>
-              <a:t>-приложение почтового отделения для управления подписками на периодические издания</a:t>
-            </a:r>
-            <a:r>
-              <a:rPr lang="en-US" b="0" i="0" dirty="0">
-                <a:solidFill>
-                  <a:srgbClr val="DCDDDE"/>
-                </a:solidFill>
-                <a:effectLst/>
-                <a:latin typeface="Calibri Light" panose="020F0302020204030204" pitchFamily="34" charset="0"/>
+                <a:ea typeface="Calibri Light" panose="020F0302020204030204" pitchFamily="34" charset="0"/>
                 <a:cs typeface="Calibri Light" panose="020F0302020204030204" pitchFamily="34" charset="0"/>
               </a:rPr>
               <a:t>.</a:t>

</xml_diff>